<commit_message>
final final final updates
</commit_message>
<xml_diff>
--- a/NBAvis_presentation.pptx
+++ b/NBAvis_presentation.pptx
@@ -3835,8 +3835,12 @@
           <a:lstStyle/>
           <a:p>
             <a:r>
-              <a:rPr lang="en-US" dirty="0" smtClean="0"/>
-              <a:t>NBA Shot Data Visualization</a:t>
+              <a:rPr lang="en-US" b="1" dirty="0"/>
+              <a:t>Intro to Data Science </a:t>
+            </a:r>
+            <a:r>
+              <a:rPr lang="en-US" b="1" dirty="0" smtClean="0"/>
+              <a:t>Workshop</a:t>
             </a:r>
             <a:endParaRPr lang="en-US" dirty="0"/>
           </a:p>
@@ -3860,13 +3864,17 @@
         </p:spPr>
         <p:txBody>
           <a:bodyPr>
-            <a:normAutofit/>
+            <a:noAutofit/>
           </a:bodyPr>
           <a:lstStyle/>
           <a:p>
             <a:r>
-              <a:rPr lang="en-US" dirty="0" smtClean="0"/>
-              <a:t>From scratch to an app in 60 minutes</a:t>
+              <a:rPr lang="en-US" sz="4000" dirty="0" err="1" smtClean="0"/>
+              <a:t>Nba</a:t>
+            </a:r>
+            <a:r>
+              <a:rPr lang="en-US" sz="4000" dirty="0" smtClean="0"/>
+              <a:t> shot data visualization</a:t>
             </a:r>
           </a:p>
         </p:txBody>
@@ -4274,7 +4282,7 @@
           <a:lstStyle/>
           <a:p>
             <a:r>
-              <a:rPr lang="en-US" smtClean="0"/>
+              <a:rPr lang="en-US" dirty="0" smtClean="0"/>
               <a:t>Launch and run app</a:t>
             </a:r>
             <a:endParaRPr lang="en-US" dirty="0"/>

</xml_diff>